<commit_message>
towards finishing the revision !
</commit_message>
<xml_diff>
--- a/figure-assembly/figure-1-components/panel_model_cartoon.pptx
+++ b/figure-assembly/figure-1-components/panel_model_cartoon.pptx
@@ -261,7 +261,7 @@
           <a:p>
             <a:fld id="{3D0D4C98-D5D6-1C45-B38F-9D83B19E74F8}" type="datetimeFigureOut">
               <a:rPr lang="en-US" smtClean="0"/>
-              <a:t>2019-10-29</a:t>
+              <a:t>2019-11-09</a:t>
             </a:fld>
             <a:endParaRPr lang="en-US"/>
           </a:p>
@@ -459,7 +459,7 @@
           <a:p>
             <a:fld id="{3D0D4C98-D5D6-1C45-B38F-9D83B19E74F8}" type="datetimeFigureOut">
               <a:rPr lang="en-US" smtClean="0"/>
-              <a:t>2019-10-29</a:t>
+              <a:t>2019-11-09</a:t>
             </a:fld>
             <a:endParaRPr lang="en-US"/>
           </a:p>
@@ -667,7 +667,7 @@
           <a:p>
             <a:fld id="{3D0D4C98-D5D6-1C45-B38F-9D83B19E74F8}" type="datetimeFigureOut">
               <a:rPr lang="en-US" smtClean="0"/>
-              <a:t>2019-10-29</a:t>
+              <a:t>2019-11-09</a:t>
             </a:fld>
             <a:endParaRPr lang="en-US"/>
           </a:p>
@@ -865,7 +865,7 @@
           <a:p>
             <a:fld id="{3D0D4C98-D5D6-1C45-B38F-9D83B19E74F8}" type="datetimeFigureOut">
               <a:rPr lang="en-US" smtClean="0"/>
-              <a:t>2019-10-29</a:t>
+              <a:t>2019-11-09</a:t>
             </a:fld>
             <a:endParaRPr lang="en-US"/>
           </a:p>
@@ -1140,7 +1140,7 @@
           <a:p>
             <a:fld id="{3D0D4C98-D5D6-1C45-B38F-9D83B19E74F8}" type="datetimeFigureOut">
               <a:rPr lang="en-US" smtClean="0"/>
-              <a:t>2019-10-29</a:t>
+              <a:t>2019-11-09</a:t>
             </a:fld>
             <a:endParaRPr lang="en-US"/>
           </a:p>
@@ -1405,7 +1405,7 @@
           <a:p>
             <a:fld id="{3D0D4C98-D5D6-1C45-B38F-9D83B19E74F8}" type="datetimeFigureOut">
               <a:rPr lang="en-US" smtClean="0"/>
-              <a:t>2019-10-29</a:t>
+              <a:t>2019-11-09</a:t>
             </a:fld>
             <a:endParaRPr lang="en-US"/>
           </a:p>
@@ -1817,7 +1817,7 @@
           <a:p>
             <a:fld id="{3D0D4C98-D5D6-1C45-B38F-9D83B19E74F8}" type="datetimeFigureOut">
               <a:rPr lang="en-US" smtClean="0"/>
-              <a:t>2019-10-29</a:t>
+              <a:t>2019-11-09</a:t>
             </a:fld>
             <a:endParaRPr lang="en-US"/>
           </a:p>
@@ -1958,7 +1958,7 @@
           <a:p>
             <a:fld id="{3D0D4C98-D5D6-1C45-B38F-9D83B19E74F8}" type="datetimeFigureOut">
               <a:rPr lang="en-US" smtClean="0"/>
-              <a:t>2019-10-29</a:t>
+              <a:t>2019-11-09</a:t>
             </a:fld>
             <a:endParaRPr lang="en-US"/>
           </a:p>
@@ -2071,7 +2071,7 @@
           <a:p>
             <a:fld id="{3D0D4C98-D5D6-1C45-B38F-9D83B19E74F8}" type="datetimeFigureOut">
               <a:rPr lang="en-US" smtClean="0"/>
-              <a:t>2019-10-29</a:t>
+              <a:t>2019-11-09</a:t>
             </a:fld>
             <a:endParaRPr lang="en-US"/>
           </a:p>
@@ -2382,7 +2382,7 @@
           <a:p>
             <a:fld id="{3D0D4C98-D5D6-1C45-B38F-9D83B19E74F8}" type="datetimeFigureOut">
               <a:rPr lang="en-US" smtClean="0"/>
-              <a:t>2019-10-29</a:t>
+              <a:t>2019-11-09</a:t>
             </a:fld>
             <a:endParaRPr lang="en-US"/>
           </a:p>
@@ -2670,7 +2670,7 @@
           <a:p>
             <a:fld id="{3D0D4C98-D5D6-1C45-B38F-9D83B19E74F8}" type="datetimeFigureOut">
               <a:rPr lang="en-US" smtClean="0"/>
-              <a:t>2019-10-29</a:t>
+              <a:t>2019-11-09</a:t>
             </a:fld>
             <a:endParaRPr lang="en-US"/>
           </a:p>
@@ -2911,7 +2911,7 @@
           <a:p>
             <a:fld id="{3D0D4C98-D5D6-1C45-B38F-9D83B19E74F8}" type="datetimeFigureOut">
               <a:rPr lang="en-US" smtClean="0"/>
-              <a:t>2019-10-29</a:t>
+              <a:t>2019-11-09</a:t>
             </a:fld>
             <a:endParaRPr lang="en-US"/>
           </a:p>
@@ -6007,8 +6007,8 @@
             </a:fontRef>
           </p:style>
         </p:cxnSp>
-        <mc:AlternateContent xmlns:mc="http://schemas.openxmlformats.org/markup-compatibility/2006" xmlns:a14="http://schemas.microsoft.com/office/drawing/2010/main">
-          <mc:Choice Requires="a14">
+        <mc:AlternateContent xmlns:mc="http://schemas.openxmlformats.org/markup-compatibility/2006">
+          <mc:Choice xmlns:a14="http://schemas.microsoft.com/office/drawing/2010/main" Requires="a14">
             <p:sp>
               <p:nvSpPr>
                 <p:cNvPr id="76" name="Rectangle 75">
@@ -6023,8 +6023,8 @@
               </p:nvSpPr>
               <p:spPr>
                 <a:xfrm>
-                  <a:off x="4506671" y="2169076"/>
-                  <a:ext cx="406457" cy="307777"/>
+                  <a:off x="4456793" y="2160763"/>
+                  <a:ext cx="469423" cy="369332"/>
                 </a:xfrm>
                 <a:prstGeom prst="rect">
                   <a:avLst/>
@@ -6044,14 +6044,14 @@
                       </m:oMathParaPr>
                       <m:oMath xmlns:m="http://schemas.openxmlformats.org/officeDocument/2006/math">
                         <m:r>
-                          <a:rPr lang="en-GB" sz="1400" i="1">
+                          <a:rPr lang="en-GB" i="1">
                             <a:latin typeface="Cambria Math" panose="02040503050406030204" pitchFamily="18" charset="0"/>
                             <a:ea typeface="Cambria Math" panose="02040503050406030204" pitchFamily="18" charset="0"/>
                           </a:rPr>
                           <m:t>𝑓</m:t>
                         </m:r>
                         <m:r>
-                          <a:rPr lang="en-GB" sz="1400" i="1" baseline="-25000">
+                          <a:rPr lang="en-GB" i="1" baseline="-25000">
                             <a:solidFill>
                               <a:srgbClr val="00B050"/>
                             </a:solidFill>
@@ -6063,12 +6063,12 @@
                       </m:oMath>
                     </m:oMathPara>
                   </a14:m>
-                  <a:endParaRPr lang="en-US" sz="1400" dirty="0"/>
+                  <a:endParaRPr lang="en-US" dirty="0"/>
                 </a:p>
               </p:txBody>
             </p:sp>
           </mc:Choice>
-          <mc:Fallback xmlns="">
+          <mc:Fallback>
             <p:sp>
               <p:nvSpPr>
                 <p:cNvPr id="76" name="Rectangle 75">
@@ -6085,8 +6085,8 @@
               </p:nvSpPr>
               <p:spPr>
                 <a:xfrm>
-                  <a:off x="4506671" y="2169076"/>
-                  <a:ext cx="406457" cy="307777"/>
+                  <a:off x="4456793" y="2160763"/>
+                  <a:ext cx="469423" cy="369332"/>
                 </a:xfrm>
                 <a:prstGeom prst="rect">
                   <a:avLst/>
@@ -6094,7 +6094,7 @@
                 <a:blipFill>
                   <a:blip r:embed="rId5"/>
                   <a:stretch>
-                    <a:fillRect b="-8000"/>
+                    <a:fillRect b="-13115"/>
                   </a:stretch>
                 </a:blipFill>
               </p:spPr>
@@ -6113,8 +6113,8 @@
             </p:sp>
           </mc:Fallback>
         </mc:AlternateContent>
-        <mc:AlternateContent xmlns:mc="http://schemas.openxmlformats.org/markup-compatibility/2006" xmlns:a14="http://schemas.microsoft.com/office/drawing/2010/main">
-          <mc:Choice Requires="a14">
+        <mc:AlternateContent xmlns:mc="http://schemas.openxmlformats.org/markup-compatibility/2006">
+          <mc:Choice xmlns:a14="http://schemas.microsoft.com/office/drawing/2010/main" Requires="a14">
             <p:sp>
               <p:nvSpPr>
                 <p:cNvPr id="77" name="Rectangle 76">
@@ -6129,8 +6129,8 @@
               </p:nvSpPr>
               <p:spPr>
                 <a:xfrm>
-                  <a:off x="4538236" y="3075271"/>
-                  <a:ext cx="394082" cy="307777"/>
+                  <a:off x="4529923" y="3091897"/>
+                  <a:ext cx="453394" cy="369332"/>
                 </a:xfrm>
                 <a:prstGeom prst="rect">
                   <a:avLst/>
@@ -6152,7 +6152,7 @@
                         <m:sSub>
                           <m:sSubPr>
                             <m:ctrlPr>
-                              <a:rPr lang="en-GB" sz="1400" i="1">
+                              <a:rPr lang="en-GB" i="1">
                                 <a:latin typeface="Cambria Math" panose="02040503050406030204" pitchFamily="18" charset="0"/>
                                 <a:ea typeface="Cambria Math" panose="02040503050406030204" pitchFamily="18" charset="0"/>
                               </a:rPr>
@@ -6160,7 +6160,7 @@
                           </m:sSubPr>
                           <m:e>
                             <m:r>
-                              <a:rPr lang="en-GB" sz="1400" i="1">
+                              <a:rPr lang="en-GB" i="1">
                                 <a:latin typeface="Cambria Math" panose="02040503050406030204" pitchFamily="18" charset="0"/>
                                 <a:ea typeface="Cambria Math" panose="02040503050406030204" pitchFamily="18" charset="0"/>
                               </a:rPr>
@@ -6169,7 +6169,7 @@
                           </m:e>
                           <m:sub>
                             <m:r>
-                              <a:rPr lang="en-GB" sz="1400" i="1">
+                              <a:rPr lang="en-GB" i="1">
                                 <a:solidFill>
                                   <a:srgbClr val="0432FF"/>
                                 </a:solidFill>
@@ -6183,12 +6183,12 @@
                       </m:oMath>
                     </m:oMathPara>
                   </a14:m>
-                  <a:endParaRPr lang="en-US" sz="1400" dirty="0"/>
+                  <a:endParaRPr lang="en-US" dirty="0"/>
                 </a:p>
               </p:txBody>
             </p:sp>
           </mc:Choice>
-          <mc:Fallback xmlns="">
+          <mc:Fallback>
             <p:sp>
               <p:nvSpPr>
                 <p:cNvPr id="77" name="Rectangle 76">
@@ -6205,8 +6205,8 @@
               </p:nvSpPr>
               <p:spPr>
                 <a:xfrm>
-                  <a:off x="4538236" y="3075271"/>
-                  <a:ext cx="394082" cy="307777"/>
+                  <a:off x="4529923" y="3091897"/>
+                  <a:ext cx="453394" cy="369332"/>
                 </a:xfrm>
                 <a:prstGeom prst="rect">
                   <a:avLst/>
@@ -6214,7 +6214,7 @@
                 <a:blipFill>
                   <a:blip r:embed="rId6"/>
                   <a:stretch>
-                    <a:fillRect b="-5882"/>
+                    <a:fillRect b="-13115"/>
                   </a:stretch>
                 </a:blipFill>
               </p:spPr>
@@ -6233,8 +6233,8 @@
             </p:sp>
           </mc:Fallback>
         </mc:AlternateContent>
-        <mc:AlternateContent xmlns:mc="http://schemas.openxmlformats.org/markup-compatibility/2006" xmlns:a14="http://schemas.microsoft.com/office/drawing/2010/main">
-          <mc:Choice Requires="a14">
+        <mc:AlternateContent xmlns:mc="http://schemas.openxmlformats.org/markup-compatibility/2006">
+          <mc:Choice xmlns:a14="http://schemas.microsoft.com/office/drawing/2010/main" Requires="a14">
             <p:sp>
               <p:nvSpPr>
                 <p:cNvPr id="78" name="Rectangle 77">
@@ -6249,8 +6249,8 @@
               </p:nvSpPr>
               <p:spPr>
                 <a:xfrm>
-                  <a:off x="5494101" y="2484079"/>
-                  <a:ext cx="409406" cy="307777"/>
+                  <a:off x="5452538" y="2425888"/>
+                  <a:ext cx="474489" cy="369332"/>
                 </a:xfrm>
                 <a:prstGeom prst="rect">
                   <a:avLst/>
@@ -6270,14 +6270,14 @@
                       </m:oMathParaPr>
                       <m:oMath xmlns:m="http://schemas.openxmlformats.org/officeDocument/2006/math">
                         <m:r>
-                          <a:rPr lang="en-GB" sz="1400" i="1">
+                          <a:rPr lang="en-GB" i="1">
                             <a:latin typeface="Cambria Math" panose="02040503050406030204" pitchFamily="18" charset="0"/>
                             <a:ea typeface="Cambria Math" panose="02040503050406030204" pitchFamily="18" charset="0"/>
                           </a:rPr>
                           <m:t>𝑓</m:t>
                         </m:r>
                         <m:r>
-                          <a:rPr lang="en-GB" sz="1400" i="1" baseline="-25000">
+                          <a:rPr lang="en-GB" i="1" baseline="-25000">
                             <a:solidFill>
                               <a:schemeClr val="bg1">
                                 <a:lumMod val="50000"/>
@@ -6291,12 +6291,12 @@
                       </m:oMath>
                     </m:oMathPara>
                   </a14:m>
-                  <a:endParaRPr lang="en-US" sz="1400" dirty="0"/>
+                  <a:endParaRPr lang="en-US" dirty="0"/>
                 </a:p>
               </p:txBody>
             </p:sp>
           </mc:Choice>
-          <mc:Fallback xmlns="">
+          <mc:Fallback>
             <p:sp>
               <p:nvSpPr>
                 <p:cNvPr id="78" name="Rectangle 77">
@@ -6313,8 +6313,8 @@
               </p:nvSpPr>
               <p:spPr>
                 <a:xfrm>
-                  <a:off x="5494101" y="2484079"/>
-                  <a:ext cx="409406" cy="307777"/>
+                  <a:off x="5452538" y="2425888"/>
+                  <a:ext cx="474489" cy="369332"/>
                 </a:xfrm>
                 <a:prstGeom prst="rect">
                   <a:avLst/>
@@ -6322,7 +6322,7 @@
                 <a:blipFill>
                   <a:blip r:embed="rId7"/>
                   <a:stretch>
-                    <a:fillRect b="-5882"/>
+                    <a:fillRect b="-11475"/>
                   </a:stretch>
                 </a:blipFill>
               </p:spPr>
@@ -6341,8 +6341,8 @@
             </p:sp>
           </mc:Fallback>
         </mc:AlternateContent>
-        <mc:AlternateContent xmlns:mc="http://schemas.openxmlformats.org/markup-compatibility/2006" xmlns:a14="http://schemas.microsoft.com/office/drawing/2010/main">
-          <mc:Choice Requires="a14">
+        <mc:AlternateContent xmlns:mc="http://schemas.openxmlformats.org/markup-compatibility/2006">
+          <mc:Choice xmlns:a14="http://schemas.microsoft.com/office/drawing/2010/main" Requires="a14">
             <p:sp>
               <p:nvSpPr>
                 <p:cNvPr id="79" name="Rectangle 78">
@@ -6358,7 +6358,7 @@
               <p:spPr>
                 <a:xfrm>
                   <a:off x="5069482" y="3010116"/>
-                  <a:ext cx="392993" cy="307777"/>
+                  <a:ext cx="452752" cy="369332"/>
                 </a:xfrm>
                 <a:prstGeom prst="rect">
                   <a:avLst/>
@@ -6380,7 +6380,7 @@
                         <m:sSub>
                           <m:sSubPr>
                             <m:ctrlPr>
-                              <a:rPr lang="en-GB" sz="1400" i="1">
+                              <a:rPr lang="en-GB" i="1">
                                 <a:latin typeface="Cambria Math" panose="02040503050406030204" pitchFamily="18" charset="0"/>
                                 <a:ea typeface="Cambria Math" panose="02040503050406030204" pitchFamily="18" charset="0"/>
                               </a:rPr>
@@ -6388,7 +6388,7 @@
                           </m:sSubPr>
                           <m:e>
                             <m:r>
-                              <a:rPr lang="en-GB" sz="1400" i="1">
+                              <a:rPr lang="en-GB" i="1">
                                 <a:latin typeface="Cambria Math" panose="02040503050406030204" pitchFamily="18" charset="0"/>
                                 <a:ea typeface="Cambria Math" panose="02040503050406030204" pitchFamily="18" charset="0"/>
                               </a:rPr>
@@ -6397,7 +6397,7 @@
                           </m:e>
                           <m:sub>
                             <m:r>
-                              <a:rPr lang="en-GB" sz="1400" i="1">
+                              <a:rPr lang="en-GB" i="1">
                                 <a:solidFill>
                                   <a:srgbClr val="FF0000"/>
                                 </a:solidFill>
@@ -6411,12 +6411,12 @@
                       </m:oMath>
                     </m:oMathPara>
                   </a14:m>
-                  <a:endParaRPr lang="en-US" sz="1400" dirty="0"/>
+                  <a:endParaRPr lang="en-US" dirty="0"/>
                 </a:p>
               </p:txBody>
             </p:sp>
           </mc:Choice>
-          <mc:Fallback xmlns="">
+          <mc:Fallback>
             <p:sp>
               <p:nvSpPr>
                 <p:cNvPr id="79" name="Rectangle 78">
@@ -6434,7 +6434,7 @@
               <p:spPr>
                 <a:xfrm>
                   <a:off x="5069482" y="3010116"/>
-                  <a:ext cx="392993" cy="307777"/>
+                  <a:ext cx="452752" cy="369332"/>
                 </a:xfrm>
                 <a:prstGeom prst="rect">
                   <a:avLst/>
@@ -6442,7 +6442,7 @@
                 <a:blipFill>
                   <a:blip r:embed="rId8"/>
                   <a:stretch>
-                    <a:fillRect b="-8000"/>
+                    <a:fillRect b="-13333"/>
                   </a:stretch>
                 </a:blipFill>
               </p:spPr>
@@ -6461,8 +6461,8 @@
             </p:sp>
           </mc:Fallback>
         </mc:AlternateContent>
-        <mc:AlternateContent xmlns:mc="http://schemas.openxmlformats.org/markup-compatibility/2006" xmlns:a14="http://schemas.microsoft.com/office/drawing/2010/main">
-          <mc:Choice Requires="a14">
+        <mc:AlternateContent xmlns:mc="http://schemas.openxmlformats.org/markup-compatibility/2006">
+          <mc:Choice xmlns:a14="http://schemas.microsoft.com/office/drawing/2010/main" Requires="a14">
             <p:sp>
               <p:nvSpPr>
                 <p:cNvPr id="80" name="Rectangle 79">
@@ -6477,8 +6477,8 @@
               </p:nvSpPr>
               <p:spPr>
                 <a:xfrm>
-                  <a:off x="5026138" y="2213061"/>
-                  <a:ext cx="398442" cy="323037"/>
+                  <a:off x="5067703" y="2104992"/>
+                  <a:ext cx="459228" cy="388889"/>
                 </a:xfrm>
                 <a:prstGeom prst="rect">
                   <a:avLst/>
@@ -6500,7 +6500,7 @@
                         <m:sSub>
                           <m:sSubPr>
                             <m:ctrlPr>
-                              <a:rPr lang="en-GB" sz="1400" i="1">
+                              <a:rPr lang="en-GB" i="1">
                                 <a:latin typeface="Cambria Math" panose="02040503050406030204" pitchFamily="18" charset="0"/>
                                 <a:ea typeface="Cambria Math" panose="02040503050406030204" pitchFamily="18" charset="0"/>
                               </a:rPr>
@@ -6508,7 +6508,7 @@
                           </m:sSubPr>
                           <m:e>
                             <m:r>
-                              <a:rPr lang="en-GB" sz="1400" i="1">
+                              <a:rPr lang="en-GB" i="1">
                                 <a:latin typeface="Cambria Math" panose="02040503050406030204" pitchFamily="18" charset="0"/>
                                 <a:ea typeface="Cambria Math" panose="02040503050406030204" pitchFamily="18" charset="0"/>
                               </a:rPr>
@@ -6517,7 +6517,7 @@
                           </m:e>
                           <m:sub>
                             <m:r>
-                              <a:rPr lang="en-GB" sz="1400" i="1">
+                              <a:rPr lang="en-GB" i="1">
                                 <a:solidFill>
                                   <a:srgbClr val="AB7942"/>
                                 </a:solidFill>
@@ -6531,12 +6531,12 @@
                       </m:oMath>
                     </m:oMathPara>
                   </a14:m>
-                  <a:endParaRPr lang="en-US" sz="1400" dirty="0"/>
+                  <a:endParaRPr lang="en-US" dirty="0"/>
                 </a:p>
               </p:txBody>
             </p:sp>
           </mc:Choice>
-          <mc:Fallback xmlns="">
+          <mc:Fallback>
             <p:sp>
               <p:nvSpPr>
                 <p:cNvPr id="80" name="Rectangle 79">
@@ -6553,8 +6553,8 @@
               </p:nvSpPr>
               <p:spPr>
                 <a:xfrm>
-                  <a:off x="5026138" y="2213061"/>
-                  <a:ext cx="398442" cy="323037"/>
+                  <a:off x="5067703" y="2104992"/>
+                  <a:ext cx="459228" cy="388889"/>
                 </a:xfrm>
                 <a:prstGeom prst="rect">
                   <a:avLst/>
@@ -6562,7 +6562,7 @@
                 <a:blipFill>
                   <a:blip r:embed="rId9"/>
                   <a:stretch>
-                    <a:fillRect b="-3774"/>
+                    <a:fillRect b="-9375"/>
                   </a:stretch>
                 </a:blipFill>
               </p:spPr>
@@ -6700,8 +6700,8 @@
           <a:chExt cx="0" cy="0"/>
         </a:xfrm>
       </p:grpSpPr>
-      <mc:AlternateContent xmlns:mc="http://schemas.openxmlformats.org/markup-compatibility/2006">
-        <mc:Choice xmlns:a14="http://schemas.microsoft.com/office/drawing/2010/main" Requires="a14">
+      <mc:AlternateContent xmlns:mc="http://schemas.openxmlformats.org/markup-compatibility/2006" xmlns:a14="http://schemas.microsoft.com/office/drawing/2010/main">
+        <mc:Choice Requires="a14">
           <p:sp>
             <p:nvSpPr>
               <p:cNvPr id="4" name="Rounded Rectangle 3">
@@ -6811,7 +6811,7 @@
             </p:txBody>
           </p:sp>
         </mc:Choice>
-        <mc:Fallback>
+        <mc:Fallback xmlns="">
           <p:sp>
             <p:nvSpPr>
               <p:cNvPr id="4" name="Rounded Rectangle 3">
@@ -6861,8 +6861,8 @@
           </p:sp>
         </mc:Fallback>
       </mc:AlternateContent>
-      <mc:AlternateContent xmlns:mc="http://schemas.openxmlformats.org/markup-compatibility/2006">
-        <mc:Choice xmlns:a14="http://schemas.microsoft.com/office/drawing/2010/main" Requires="a14">
+      <mc:AlternateContent xmlns:mc="http://schemas.openxmlformats.org/markup-compatibility/2006" xmlns:a14="http://schemas.microsoft.com/office/drawing/2010/main">
+        <mc:Choice Requires="a14">
           <p:sp>
             <p:nvSpPr>
               <p:cNvPr id="10" name="Rounded Rectangle 9">
@@ -7265,7 +7265,7 @@
             </p:txBody>
           </p:sp>
         </mc:Choice>
-        <mc:Fallback>
+        <mc:Fallback xmlns="">
           <p:sp>
             <p:nvSpPr>
               <p:cNvPr id="10" name="Rounded Rectangle 9">
@@ -7316,8 +7316,8 @@
           </p:sp>
         </mc:Fallback>
       </mc:AlternateContent>
-      <mc:AlternateContent xmlns:mc="http://schemas.openxmlformats.org/markup-compatibility/2006">
-        <mc:Choice xmlns:a14="http://schemas.microsoft.com/office/drawing/2010/main" Requires="a14">
+      <mc:AlternateContent xmlns:mc="http://schemas.openxmlformats.org/markup-compatibility/2006" xmlns:a14="http://schemas.microsoft.com/office/drawing/2010/main">
+        <mc:Choice Requires="a14">
           <p:sp>
             <p:nvSpPr>
               <p:cNvPr id="11" name="Rounded Rectangle 10">
@@ -7439,7 +7439,7 @@
             </p:txBody>
           </p:sp>
         </mc:Choice>
-        <mc:Fallback>
+        <mc:Fallback xmlns="">
           <p:sp>
             <p:nvSpPr>
               <p:cNvPr id="11" name="Rounded Rectangle 10">
@@ -7491,8 +7491,8 @@
           </p:sp>
         </mc:Fallback>
       </mc:AlternateContent>
-      <mc:AlternateContent xmlns:mc="http://schemas.openxmlformats.org/markup-compatibility/2006">
-        <mc:Choice xmlns:a14="http://schemas.microsoft.com/office/drawing/2010/main" Requires="a14">
+      <mc:AlternateContent xmlns:mc="http://schemas.openxmlformats.org/markup-compatibility/2006" xmlns:a14="http://schemas.microsoft.com/office/drawing/2010/main">
+        <mc:Choice Requires="a14">
           <p:sp>
             <p:nvSpPr>
               <p:cNvPr id="12" name="Rounded Rectangle 11">
@@ -7600,7 +7600,7 @@
             </p:txBody>
           </p:sp>
         </mc:Choice>
-        <mc:Fallback>
+        <mc:Fallback xmlns="">
           <p:sp>
             <p:nvSpPr>
               <p:cNvPr id="12" name="Rounded Rectangle 11">
@@ -7651,8 +7651,8 @@
           </p:sp>
         </mc:Fallback>
       </mc:AlternateContent>
-      <mc:AlternateContent xmlns:mc="http://schemas.openxmlformats.org/markup-compatibility/2006">
-        <mc:Choice xmlns:a14="http://schemas.microsoft.com/office/drawing/2010/main" Requires="a14">
+      <mc:AlternateContent xmlns:mc="http://schemas.openxmlformats.org/markup-compatibility/2006" xmlns:a14="http://schemas.microsoft.com/office/drawing/2010/main">
+        <mc:Choice Requires="a14">
           <p:sp>
             <p:nvSpPr>
               <p:cNvPr id="13" name="Rounded Rectangle 12">
@@ -7749,7 +7749,7 @@
             </p:txBody>
           </p:sp>
         </mc:Choice>
-        <mc:Fallback>
+        <mc:Fallback xmlns="">
           <p:sp>
             <p:nvSpPr>
               <p:cNvPr id="13" name="Rounded Rectangle 12">
@@ -7843,8 +7843,8 @@
           </a:p>
         </p:txBody>
       </p:sp>
-      <mc:AlternateContent xmlns:mc="http://schemas.openxmlformats.org/markup-compatibility/2006">
-        <mc:Choice xmlns:a14="http://schemas.microsoft.com/office/drawing/2010/main" Requires="a14">
+      <mc:AlternateContent xmlns:mc="http://schemas.openxmlformats.org/markup-compatibility/2006" xmlns:a14="http://schemas.microsoft.com/office/drawing/2010/main">
+        <mc:Choice Requires="a14">
           <p:sp>
             <p:nvSpPr>
               <p:cNvPr id="15" name="TextBox 14">
@@ -7998,7 +7998,7 @@
             </p:txBody>
           </p:sp>
         </mc:Choice>
-        <mc:Fallback>
+        <mc:Fallback xmlns="">
           <p:sp>
             <p:nvSpPr>
               <p:cNvPr id="15" name="TextBox 14">
@@ -8220,8 +8220,8 @@
           </a:p>
         </p:txBody>
       </p:sp>
-      <mc:AlternateContent xmlns:mc="http://schemas.openxmlformats.org/markup-compatibility/2006">
-        <mc:Choice xmlns:a14="http://schemas.microsoft.com/office/drawing/2010/main" Requires="a14">
+      <mc:AlternateContent xmlns:mc="http://schemas.openxmlformats.org/markup-compatibility/2006" xmlns:a14="http://schemas.microsoft.com/office/drawing/2010/main">
+        <mc:Choice Requires="a14">
           <p:sp>
             <p:nvSpPr>
               <p:cNvPr id="18" name="TextBox 17">
@@ -8574,7 +8574,7 @@
             </p:txBody>
           </p:sp>
         </mc:Choice>
-        <mc:Fallback>
+        <mc:Fallback xmlns="">
           <p:sp>
             <p:nvSpPr>
               <p:cNvPr id="18" name="TextBox 17">
@@ -8619,8 +8619,8 @@
           </p:sp>
         </mc:Fallback>
       </mc:AlternateContent>
-      <mc:AlternateContent xmlns:mc="http://schemas.openxmlformats.org/markup-compatibility/2006">
-        <mc:Choice xmlns:a14="http://schemas.microsoft.com/office/drawing/2010/main" Requires="a14">
+      <mc:AlternateContent xmlns:mc="http://schemas.openxmlformats.org/markup-compatibility/2006" xmlns:a14="http://schemas.microsoft.com/office/drawing/2010/main">
+        <mc:Choice Requires="a14">
           <p:sp>
             <p:nvSpPr>
               <p:cNvPr id="19" name="TextBox 13">
@@ -8938,7 +8938,7 @@
             </p:txBody>
           </p:sp>
         </mc:Choice>
-        <mc:Fallback>
+        <mc:Fallback xmlns="">
           <p:sp>
             <p:nvSpPr>
               <p:cNvPr id="19" name="TextBox 13">
@@ -9115,8 +9115,8 @@
           </a:p>
         </p:txBody>
       </p:sp>
-      <mc:AlternateContent xmlns:mc="http://schemas.openxmlformats.org/markup-compatibility/2006">
-        <mc:Choice xmlns:a14="http://schemas.microsoft.com/office/drawing/2010/main" Requires="a14">
+      <mc:AlternateContent xmlns:mc="http://schemas.openxmlformats.org/markup-compatibility/2006" xmlns:a14="http://schemas.microsoft.com/office/drawing/2010/main">
+        <mc:Choice Requires="a14">
           <p:sp>
             <p:nvSpPr>
               <p:cNvPr id="21" name="Rounded Rectangle 9">
@@ -9219,7 +9219,7 @@
             </p:txBody>
           </p:sp>
         </mc:Choice>
-        <mc:Fallback>
+        <mc:Fallback xmlns="">
           <p:sp>
             <p:nvSpPr>
               <p:cNvPr id="21" name="Rounded Rectangle 9">
@@ -9308,37 +9308,7 @@
                 <a:latin typeface="Arial" panose="020B0604020202020204" pitchFamily="34" charset="0"/>
                 <a:cs typeface="Arial" panose="020B0604020202020204" pitchFamily="34" charset="0"/>
               </a:rPr>
-              <a:t>Imposed </a:t>
-            </a:r>
-            <a:r>
-              <a:rPr lang="en-US" sz="1300" i="1" dirty="0" smtClean="0">
-                <a:solidFill>
-                  <a:prstClr val="black"/>
-                </a:solidFill>
-                <a:latin typeface="Arial" panose="020B0604020202020204" pitchFamily="34" charset="0"/>
-                <a:cs typeface="Arial" panose="020B0604020202020204" pitchFamily="34" charset="0"/>
-              </a:rPr>
-              <a:t>allocation </a:t>
-            </a:r>
-            <a:r>
-              <a:rPr lang="en-US" sz="1300" i="1" dirty="0" smtClean="0">
-                <a:solidFill>
-                  <a:prstClr val="black"/>
-                </a:solidFill>
-                <a:latin typeface="Arial" panose="020B0604020202020204" pitchFamily="34" charset="0"/>
-                <a:cs typeface="Arial" panose="020B0604020202020204" pitchFamily="34" charset="0"/>
-              </a:rPr>
-              <a:t>to useless </a:t>
-            </a:r>
-            <a:r>
-              <a:rPr lang="en-US" sz="1300" i="1" dirty="0" smtClean="0">
-                <a:solidFill>
-                  <a:prstClr val="black"/>
-                </a:solidFill>
-                <a:latin typeface="Arial" panose="020B0604020202020204" pitchFamily="34" charset="0"/>
-                <a:cs typeface="Arial" panose="020B0604020202020204" pitchFamily="34" charset="0"/>
-              </a:rPr>
-              <a:t>proteins</a:t>
+              <a:t>Imposed allocation to useless proteins</a:t>
             </a:r>
           </a:p>
         </p:txBody>

</xml_diff>